<commit_message>
Addedd slide on case sensitivity, comments, line endings
</commit_message>
<xml_diff>
--- a/CPlusPlus/01_essential_cpp_basics.pptx
+++ b/CPlusPlus/01_essential_cpp_basics.pptx
@@ -5,7 +5,7 @@
     <p:sldMasterId id="2147483660" r:id="rId1"/>
   </p:sldMasterIdLst>
   <p:notesMasterIdLst>
-    <p:notesMasterId r:id="rId29"/>
+    <p:notesMasterId r:id="rId30"/>
   </p:notesMasterIdLst>
   <p:sldIdLst>
     <p:sldId id="289" r:id="rId2"/>
@@ -18,23 +18,24 @@
     <p:sldId id="267" r:id="rId9"/>
     <p:sldId id="268" r:id="rId10"/>
     <p:sldId id="269" r:id="rId11"/>
-    <p:sldId id="270" r:id="rId12"/>
-    <p:sldId id="272" r:id="rId13"/>
-    <p:sldId id="284" r:id="rId14"/>
-    <p:sldId id="285" r:id="rId15"/>
-    <p:sldId id="281" r:id="rId16"/>
-    <p:sldId id="282" r:id="rId17"/>
-    <p:sldId id="271" r:id="rId18"/>
-    <p:sldId id="274" r:id="rId19"/>
-    <p:sldId id="275" r:id="rId20"/>
-    <p:sldId id="273" r:id="rId21"/>
-    <p:sldId id="277" r:id="rId22"/>
-    <p:sldId id="276" r:id="rId23"/>
-    <p:sldId id="278" r:id="rId24"/>
-    <p:sldId id="279" r:id="rId25"/>
-    <p:sldId id="280" r:id="rId26"/>
-    <p:sldId id="286" r:id="rId27"/>
-    <p:sldId id="287" r:id="rId28"/>
+    <p:sldId id="290" r:id="rId12"/>
+    <p:sldId id="270" r:id="rId13"/>
+    <p:sldId id="272" r:id="rId14"/>
+    <p:sldId id="284" r:id="rId15"/>
+    <p:sldId id="285" r:id="rId16"/>
+    <p:sldId id="281" r:id="rId17"/>
+    <p:sldId id="282" r:id="rId18"/>
+    <p:sldId id="271" r:id="rId19"/>
+    <p:sldId id="274" r:id="rId20"/>
+    <p:sldId id="275" r:id="rId21"/>
+    <p:sldId id="273" r:id="rId22"/>
+    <p:sldId id="277" r:id="rId23"/>
+    <p:sldId id="276" r:id="rId24"/>
+    <p:sldId id="278" r:id="rId25"/>
+    <p:sldId id="279" r:id="rId26"/>
+    <p:sldId id="280" r:id="rId27"/>
+    <p:sldId id="286" r:id="rId28"/>
+    <p:sldId id="287" r:id="rId29"/>
   </p:sldIdLst>
   <p:sldSz cx="9144000" cy="6858000" type="screen4x3"/>
   <p:notesSz cx="6858000" cy="9144000"/>
@@ -223,7 +224,7 @@
           <a:p>
             <a:fld id="{959286F1-78EA-4A32-8D12-1F28CCE43A8D}" type="datetimeFigureOut">
               <a:rPr lang="en-US" smtClean="0"/>
-              <a:t>2017-02-14</a:t>
+              <a:t>2017-02-20</a:t>
             </a:fld>
             <a:endParaRPr lang="en-US"/>
           </a:p>
@@ -622,7 +623,7 @@
           <a:p>
             <a:fld id="{7E64AD2A-13EC-46C7-9287-3CACAC3798D5}" type="datetime1">
               <a:rPr lang="en-US" smtClean="0"/>
-              <a:t>2017-02-14</a:t>
+              <a:t>2017-02-20</a:t>
             </a:fld>
             <a:endParaRPr lang="en-US"/>
           </a:p>
@@ -792,7 +793,7 @@
           <a:p>
             <a:fld id="{43AE06E8-3793-4EB5-8012-97A6BFC78375}" type="datetime1">
               <a:rPr lang="en-US" smtClean="0"/>
-              <a:t>2017-02-14</a:t>
+              <a:t>2017-02-20</a:t>
             </a:fld>
             <a:endParaRPr lang="en-US"/>
           </a:p>
@@ -972,7 +973,7 @@
           <a:p>
             <a:fld id="{E234FBB9-2650-4E82-9375-3AD81E2FC1C9}" type="datetime1">
               <a:rPr lang="en-US" smtClean="0"/>
-              <a:t>2017-02-14</a:t>
+              <a:t>2017-02-20</a:t>
             </a:fld>
             <a:endParaRPr lang="en-US"/>
           </a:p>
@@ -1142,7 +1143,7 @@
           <a:p>
             <a:fld id="{913E3CEC-9565-4823-A6C8-B34B815EB4CE}" type="datetime1">
               <a:rPr lang="en-US" smtClean="0"/>
-              <a:t>2017-02-14</a:t>
+              <a:t>2017-02-20</a:t>
             </a:fld>
             <a:endParaRPr lang="en-US"/>
           </a:p>
@@ -1386,7 +1387,7 @@
           <a:p>
             <a:fld id="{F5251CD9-EE9A-4CFE-A7E1-729B5C9F077D}" type="datetime1">
               <a:rPr lang="en-US" smtClean="0"/>
-              <a:t>2017-02-14</a:t>
+              <a:t>2017-02-20</a:t>
             </a:fld>
             <a:endParaRPr lang="en-US"/>
           </a:p>
@@ -1618,7 +1619,7 @@
           <a:p>
             <a:fld id="{9D8A7943-CAAB-4232-A550-28565CC8A736}" type="datetime1">
               <a:rPr lang="en-US" smtClean="0"/>
-              <a:t>2017-02-14</a:t>
+              <a:t>2017-02-20</a:t>
             </a:fld>
             <a:endParaRPr lang="en-US"/>
           </a:p>
@@ -1985,7 +1986,7 @@
           <a:p>
             <a:fld id="{AECA22B3-9CAA-48F4-B0A5-AAC29DCE38BB}" type="datetime1">
               <a:rPr lang="en-US" smtClean="0"/>
-              <a:t>2017-02-14</a:t>
+              <a:t>2017-02-20</a:t>
             </a:fld>
             <a:endParaRPr lang="en-US"/>
           </a:p>
@@ -2103,7 +2104,7 @@
           <a:p>
             <a:fld id="{17BEA515-885F-453F-9DB6-FB7EBDD5269C}" type="datetime1">
               <a:rPr lang="en-US" smtClean="0"/>
-              <a:t>2017-02-14</a:t>
+              <a:t>2017-02-20</a:t>
             </a:fld>
             <a:endParaRPr lang="en-US"/>
           </a:p>
@@ -2198,7 +2199,7 @@
           <a:p>
             <a:fld id="{DF49C002-0A7D-4B38-A829-C7867DEAC314}" type="datetime1">
               <a:rPr lang="en-US" smtClean="0"/>
-              <a:t>2017-02-14</a:t>
+              <a:t>2017-02-20</a:t>
             </a:fld>
             <a:endParaRPr lang="en-US"/>
           </a:p>
@@ -2475,7 +2476,7 @@
           <a:p>
             <a:fld id="{DF81AE77-813F-4EB7-92DB-CEFC7AEFB117}" type="datetime1">
               <a:rPr lang="en-US" smtClean="0"/>
-              <a:t>2017-02-14</a:t>
+              <a:t>2017-02-20</a:t>
             </a:fld>
             <a:endParaRPr lang="en-US"/>
           </a:p>
@@ -2732,7 +2733,7 @@
           <a:p>
             <a:fld id="{C3D8A7DD-E8A7-4B8B-A1C0-3939B552071F}" type="datetime1">
               <a:rPr lang="en-US" smtClean="0"/>
-              <a:t>2017-02-14</a:t>
+              <a:t>2017-02-20</a:t>
             </a:fld>
             <a:endParaRPr lang="en-US"/>
           </a:p>
@@ -2945,7 +2946,7 @@
           <a:p>
             <a:fld id="{0DDF3A26-7F7C-417D-882D-6FCBBDE254C3}" type="datetime1">
               <a:rPr lang="en-US" smtClean="0"/>
-              <a:t>2017-02-14</a:t>
+              <a:t>2017-02-20</a:t>
             </a:fld>
             <a:endParaRPr lang="en-US"/>
           </a:p>
@@ -3368,11 +3369,7 @@
           <a:p>
             <a:r>
               <a:rPr lang="en-US" dirty="0" smtClean="0"/>
-              <a:t>Essential C</a:t>
-            </a:r>
-            <a:r>
-              <a:rPr lang="en-US" dirty="0" smtClean="0"/>
-              <a:t>++</a:t>
+              <a:t>Essential C++</a:t>
             </a:r>
             <a:r>
               <a:rPr lang="en-US" dirty="0"/>
@@ -4877,7 +4874,7 @@
           <a:p>
             <a:r>
               <a:rPr lang="en-US" dirty="0" smtClean="0"/>
-              <a:t>Task: data transformation</a:t>
+              <a:t>General remarks</a:t>
             </a:r>
             <a:endParaRPr lang="en-US" dirty="0"/>
           </a:p>
@@ -4900,49 +4897,59 @@
           <a:p>
             <a:r>
               <a:rPr lang="en-US" dirty="0" smtClean="0"/>
-              <a:t>File </a:t>
+              <a:t>C++ is case sensitive</a:t>
+            </a:r>
+          </a:p>
+          <a:p>
+            <a:pPr lvl="1"/>
+            <a:r>
+              <a:rPr lang="en-US" dirty="0" smtClean="0"/>
+              <a:t>language keywords</a:t>
+            </a:r>
+          </a:p>
+          <a:p>
+            <a:pPr lvl="1"/>
+            <a:r>
+              <a:rPr lang="en-US" dirty="0" smtClean="0"/>
+              <a:t>variable, function, class names</a:t>
+            </a:r>
+          </a:p>
+          <a:p>
+            <a:r>
+              <a:rPr lang="en-US" dirty="0" smtClean="0"/>
+              <a:t>Statements end with </a:t>
             </a:r>
             <a:r>
               <a:rPr lang="en-US" dirty="0" smtClean="0">
                 <a:latin typeface="Courier New" panose="02070309020205020404" pitchFamily="49" charset="0"/>
                 <a:cs typeface="Courier New" panose="02070309020205020404" pitchFamily="49" charset="0"/>
               </a:rPr>
-              <a:t>data.txt</a:t>
-            </a:r>
+              <a:t>;</a:t>
+            </a:r>
+          </a:p>
+          <a:p>
             <a:r>
               <a:rPr lang="en-US" dirty="0" smtClean="0"/>
-              <a:t> contains coordinates in 2D, compute distance from origin, write to </a:t>
-            </a:r>
-            <a:r>
-              <a:rPr lang="en-US" dirty="0" smtClean="0">
-                <a:latin typeface="Courier New" panose="02070309020205020404" pitchFamily="49" charset="0"/>
-                <a:cs typeface="Courier New" panose="02070309020205020404" pitchFamily="49" charset="0"/>
-              </a:rPr>
-              <a:t>out.txt</a:t>
-            </a:r>
-          </a:p>
-          <a:p>
-            <a:endParaRPr lang="en-US" dirty="0">
-              <a:latin typeface="Courier New" panose="02070309020205020404" pitchFamily="49" charset="0"/>
-              <a:cs typeface="Courier New" panose="02070309020205020404" pitchFamily="49" charset="0"/>
-            </a:endParaRPr>
-          </a:p>
-          <a:p>
-            <a:endParaRPr lang="en-US" dirty="0" smtClean="0">
-              <a:latin typeface="Courier New" panose="02070309020205020404" pitchFamily="49" charset="0"/>
-              <a:cs typeface="Courier New" panose="02070309020205020404" pitchFamily="49" charset="0"/>
-            </a:endParaRPr>
-          </a:p>
-          <a:p>
-            <a:endParaRPr lang="en-US" dirty="0">
-              <a:latin typeface="Courier New" panose="02070309020205020404" pitchFamily="49" charset="0"/>
-              <a:cs typeface="Courier New" panose="02070309020205020404" pitchFamily="49" charset="0"/>
-            </a:endParaRPr>
-          </a:p>
-          <a:p>
-            <a:endParaRPr lang="en-US" dirty="0">
-              <a:cs typeface="Courier New" panose="02070309020205020404" pitchFamily="49" charset="0"/>
-            </a:endParaRPr>
+              <a:t>Comments</a:t>
+            </a:r>
+          </a:p>
+          <a:p>
+            <a:pPr lvl="1"/>
+            <a:r>
+              <a:rPr lang="en-US" dirty="0" smtClean="0"/>
+              <a:t>line comment</a:t>
+            </a:r>
+          </a:p>
+          <a:p>
+            <a:pPr lvl="1"/>
+            <a:endParaRPr lang="en-US" dirty="0"/>
+          </a:p>
+          <a:p>
+            <a:pPr lvl="1"/>
+            <a:r>
+              <a:rPr lang="en-US" dirty="0" smtClean="0"/>
+              <a:t>block comment</a:t>
+            </a:r>
           </a:p>
         </p:txBody>
       </p:sp>
@@ -4964,6 +4971,696 @@
             <a:fld id="{033373DF-BCDA-4600-B448-AFBDB22F4A39}" type="slidenum">
               <a:rPr lang="en-US" smtClean="0"/>
               <a:t>11</a:t>
+            </a:fld>
+            <a:endParaRPr lang="en-US"/>
+          </a:p>
+        </p:txBody>
+      </p:sp>
+      <p:sp>
+        <p:nvSpPr>
+          <p:cNvPr id="5" name="TextBox 4"/>
+          <p:cNvSpPr txBox="1"/>
+          <p:nvPr/>
+        </p:nvSpPr>
+        <p:spPr>
+          <a:xfrm>
+            <a:off x="1169424" y="4527561"/>
+            <a:ext cx="4779091" cy="338554"/>
+          </a:xfrm>
+          <a:prstGeom prst="rect">
+            <a:avLst/>
+          </a:prstGeom>
+          <a:solidFill>
+            <a:schemeClr val="bg1">
+              <a:lumMod val="75000"/>
+            </a:schemeClr>
+          </a:solidFill>
+        </p:spPr>
+        <p:txBody>
+          <a:bodyPr wrap="square" rtlCol="0">
+            <a:spAutoFit/>
+          </a:bodyPr>
+          <a:lstStyle/>
+          <a:p>
+            <a:r>
+              <a:rPr lang="en-US" sz="1600" dirty="0" err="1" smtClean="0">
+                <a:latin typeface="Courier New" pitchFamily="49" charset="0"/>
+                <a:cs typeface="Courier New" pitchFamily="49" charset="0"/>
+              </a:rPr>
+              <a:t>int</a:t>
+            </a:r>
+            <a:r>
+              <a:rPr lang="en-US" sz="1600" dirty="0" smtClean="0">
+                <a:latin typeface="Courier New" pitchFamily="49" charset="0"/>
+                <a:cs typeface="Courier New" pitchFamily="49" charset="0"/>
+              </a:rPr>
+              <a:t> n {10};  </a:t>
+            </a:r>
+            <a:r>
+              <a:rPr lang="en-US" sz="1600" b="1" dirty="0" smtClean="0">
+                <a:solidFill>
+                  <a:srgbClr val="C00000"/>
+                </a:solidFill>
+                <a:latin typeface="Courier New" pitchFamily="49" charset="0"/>
+                <a:cs typeface="Courier New" pitchFamily="49" charset="0"/>
+              </a:rPr>
+              <a:t>//</a:t>
+            </a:r>
+            <a:r>
+              <a:rPr lang="en-US" sz="1600" dirty="0" smtClean="0">
+                <a:latin typeface="Courier New" pitchFamily="49" charset="0"/>
+                <a:cs typeface="Courier New" pitchFamily="49" charset="0"/>
+              </a:rPr>
+              <a:t> this is a comment</a:t>
+            </a:r>
+            <a:endParaRPr lang="en-US" sz="1600" dirty="0">
+              <a:latin typeface="Courier New" pitchFamily="49" charset="0"/>
+              <a:cs typeface="Courier New" pitchFamily="49" charset="0"/>
+            </a:endParaRPr>
+          </a:p>
+        </p:txBody>
+      </p:sp>
+      <p:sp>
+        <p:nvSpPr>
+          <p:cNvPr id="6" name="TextBox 5"/>
+          <p:cNvSpPr txBox="1"/>
+          <p:nvPr/>
+        </p:nvSpPr>
+        <p:spPr>
+          <a:xfrm>
+            <a:off x="1169424" y="5352262"/>
+            <a:ext cx="4779091" cy="1323439"/>
+          </a:xfrm>
+          <a:prstGeom prst="rect">
+            <a:avLst/>
+          </a:prstGeom>
+          <a:solidFill>
+            <a:schemeClr val="bg1">
+              <a:lumMod val="75000"/>
+            </a:schemeClr>
+          </a:solidFill>
+        </p:spPr>
+        <p:txBody>
+          <a:bodyPr wrap="square" rtlCol="0">
+            <a:spAutoFit/>
+          </a:bodyPr>
+          <a:lstStyle/>
+          <a:p>
+            <a:r>
+              <a:rPr lang="en-US" sz="1600" b="1" dirty="0" smtClean="0">
+                <a:solidFill>
+                  <a:srgbClr val="C00000"/>
+                </a:solidFill>
+                <a:latin typeface="Courier New" pitchFamily="49" charset="0"/>
+                <a:cs typeface="Courier New" pitchFamily="49" charset="0"/>
+              </a:rPr>
+              <a:t>/*</a:t>
+            </a:r>
+          </a:p>
+          <a:p>
+            <a:r>
+              <a:rPr lang="en-US" sz="1600" dirty="0">
+                <a:latin typeface="Courier New" pitchFamily="49" charset="0"/>
+                <a:cs typeface="Courier New" pitchFamily="49" charset="0"/>
+              </a:rPr>
+              <a:t> </a:t>
+            </a:r>
+            <a:r>
+              <a:rPr lang="en-US" sz="1600" dirty="0" smtClean="0">
+                <a:latin typeface="Courier New" pitchFamily="49" charset="0"/>
+                <a:cs typeface="Courier New" pitchFamily="49" charset="0"/>
+              </a:rPr>
+              <a:t>This is a</a:t>
+            </a:r>
+          </a:p>
+          <a:p>
+            <a:r>
+              <a:rPr lang="en-US" sz="1600" dirty="0">
+                <a:latin typeface="Courier New" pitchFamily="49" charset="0"/>
+                <a:cs typeface="Courier New" pitchFamily="49" charset="0"/>
+              </a:rPr>
+              <a:t> </a:t>
+            </a:r>
+            <a:r>
+              <a:rPr lang="en-US" sz="1600" dirty="0" smtClean="0">
+                <a:latin typeface="Courier New" pitchFamily="49" charset="0"/>
+                <a:cs typeface="Courier New" pitchFamily="49" charset="0"/>
+              </a:rPr>
+              <a:t>multi-line </a:t>
+            </a:r>
+          </a:p>
+          <a:p>
+            <a:r>
+              <a:rPr lang="en-US" sz="1600" dirty="0">
+                <a:latin typeface="Courier New" pitchFamily="49" charset="0"/>
+                <a:cs typeface="Courier New" pitchFamily="49" charset="0"/>
+              </a:rPr>
+              <a:t> </a:t>
+            </a:r>
+            <a:r>
+              <a:rPr lang="en-US" sz="1600" dirty="0" smtClean="0">
+                <a:latin typeface="Courier New" pitchFamily="49" charset="0"/>
+                <a:cs typeface="Courier New" pitchFamily="49" charset="0"/>
+              </a:rPr>
+              <a:t>comment.</a:t>
+            </a:r>
+          </a:p>
+          <a:p>
+            <a:r>
+              <a:rPr lang="en-US" sz="1600" b="1" dirty="0" smtClean="0">
+                <a:solidFill>
+                  <a:srgbClr val="C00000"/>
+                </a:solidFill>
+                <a:latin typeface="Courier New" pitchFamily="49" charset="0"/>
+                <a:cs typeface="Courier New" pitchFamily="49" charset="0"/>
+              </a:rPr>
+              <a:t>*/</a:t>
+            </a:r>
+            <a:endParaRPr lang="en-US" sz="1600" b="1" dirty="0">
+              <a:solidFill>
+                <a:srgbClr val="C00000"/>
+              </a:solidFill>
+              <a:latin typeface="Courier New" pitchFamily="49" charset="0"/>
+              <a:cs typeface="Courier New" pitchFamily="49" charset="0"/>
+            </a:endParaRPr>
+          </a:p>
+        </p:txBody>
+      </p:sp>
+    </p:spTree>
+    <p:extLst>
+      <p:ext uri="{BB962C8B-B14F-4D97-AF65-F5344CB8AC3E}">
+        <p14:creationId xmlns:p14="http://schemas.microsoft.com/office/powerpoint/2010/main" val="2580233756"/>
+      </p:ext>
+    </p:extLst>
+  </p:cSld>
+  <p:clrMapOvr>
+    <a:masterClrMapping/>
+  </p:clrMapOvr>
+  <p:timing>
+    <p:tnLst>
+      <p:par>
+        <p:cTn id="1" dur="indefinite" restart="never" nodeType="tmRoot">
+          <p:childTnLst>
+            <p:seq concurrent="1" nextAc="seek">
+              <p:cTn id="2" dur="indefinite" nodeType="mainSeq">
+                <p:childTnLst>
+                  <p:par>
+                    <p:cTn id="3" fill="hold">
+                      <p:stCondLst>
+                        <p:cond delay="indefinite"/>
+                        <p:cond evt="onBegin" delay="0">
+                          <p:tn val="2"/>
+                        </p:cond>
+                      </p:stCondLst>
+                      <p:childTnLst>
+                        <p:par>
+                          <p:cTn id="4" fill="hold">
+                            <p:stCondLst>
+                              <p:cond delay="0"/>
+                            </p:stCondLst>
+                            <p:childTnLst>
+                              <p:par>
+                                <p:cTn id="5" presetID="1" presetClass="entr" presetSubtype="0" fill="hold" grpId="0" nodeType="withEffect">
+                                  <p:stCondLst>
+                                    <p:cond delay="0"/>
+                                  </p:stCondLst>
+                                  <p:childTnLst>
+                                    <p:set>
+                                      <p:cBhvr>
+                                        <p:cTn id="6" dur="1" fill="hold">
+                                          <p:stCondLst>
+                                            <p:cond delay="0"/>
+                                          </p:stCondLst>
+                                        </p:cTn>
+                                        <p:tgtEl>
+                                          <p:spTgt spid="3">
+                                            <p:txEl>
+                                              <p:pRg st="0" end="0"/>
+                                            </p:txEl>
+                                          </p:spTgt>
+                                        </p:tgtEl>
+                                        <p:attrNameLst>
+                                          <p:attrName>style.visibility</p:attrName>
+                                        </p:attrNameLst>
+                                      </p:cBhvr>
+                                      <p:to>
+                                        <p:strVal val="visible"/>
+                                      </p:to>
+                                    </p:set>
+                                  </p:childTnLst>
+                                </p:cTn>
+                              </p:par>
+                              <p:par>
+                                <p:cTn id="7" presetID="1" presetClass="entr" presetSubtype="0" fill="hold" grpId="0" nodeType="withEffect">
+                                  <p:stCondLst>
+                                    <p:cond delay="0"/>
+                                  </p:stCondLst>
+                                  <p:childTnLst>
+                                    <p:set>
+                                      <p:cBhvr>
+                                        <p:cTn id="8" dur="1" fill="hold">
+                                          <p:stCondLst>
+                                            <p:cond delay="0"/>
+                                          </p:stCondLst>
+                                        </p:cTn>
+                                        <p:tgtEl>
+                                          <p:spTgt spid="3">
+                                            <p:txEl>
+                                              <p:pRg st="1" end="1"/>
+                                            </p:txEl>
+                                          </p:spTgt>
+                                        </p:tgtEl>
+                                        <p:attrNameLst>
+                                          <p:attrName>style.visibility</p:attrName>
+                                        </p:attrNameLst>
+                                      </p:cBhvr>
+                                      <p:to>
+                                        <p:strVal val="visible"/>
+                                      </p:to>
+                                    </p:set>
+                                  </p:childTnLst>
+                                </p:cTn>
+                              </p:par>
+                              <p:par>
+                                <p:cTn id="9" presetID="1" presetClass="entr" presetSubtype="0" fill="hold" grpId="0" nodeType="withEffect">
+                                  <p:stCondLst>
+                                    <p:cond delay="0"/>
+                                  </p:stCondLst>
+                                  <p:childTnLst>
+                                    <p:set>
+                                      <p:cBhvr>
+                                        <p:cTn id="10" dur="1" fill="hold">
+                                          <p:stCondLst>
+                                            <p:cond delay="0"/>
+                                          </p:stCondLst>
+                                        </p:cTn>
+                                        <p:tgtEl>
+                                          <p:spTgt spid="3">
+                                            <p:txEl>
+                                              <p:pRg st="2" end="2"/>
+                                            </p:txEl>
+                                          </p:spTgt>
+                                        </p:tgtEl>
+                                        <p:attrNameLst>
+                                          <p:attrName>style.visibility</p:attrName>
+                                        </p:attrNameLst>
+                                      </p:cBhvr>
+                                      <p:to>
+                                        <p:strVal val="visible"/>
+                                      </p:to>
+                                    </p:set>
+                                  </p:childTnLst>
+                                </p:cTn>
+                              </p:par>
+                            </p:childTnLst>
+                          </p:cTn>
+                        </p:par>
+                      </p:childTnLst>
+                    </p:cTn>
+                  </p:par>
+                  <p:par>
+                    <p:cTn id="11" fill="hold">
+                      <p:stCondLst>
+                        <p:cond delay="indefinite"/>
+                      </p:stCondLst>
+                      <p:childTnLst>
+                        <p:par>
+                          <p:cTn id="12" fill="hold">
+                            <p:stCondLst>
+                              <p:cond delay="0"/>
+                            </p:stCondLst>
+                            <p:childTnLst>
+                              <p:par>
+                                <p:cTn id="13" presetID="1" presetClass="entr" presetSubtype="0" fill="hold" grpId="0" nodeType="clickEffect">
+                                  <p:stCondLst>
+                                    <p:cond delay="0"/>
+                                  </p:stCondLst>
+                                  <p:childTnLst>
+                                    <p:set>
+                                      <p:cBhvr>
+                                        <p:cTn id="14" dur="1" fill="hold">
+                                          <p:stCondLst>
+                                            <p:cond delay="0"/>
+                                          </p:stCondLst>
+                                        </p:cTn>
+                                        <p:tgtEl>
+                                          <p:spTgt spid="3">
+                                            <p:txEl>
+                                              <p:pRg st="3" end="3"/>
+                                            </p:txEl>
+                                          </p:spTgt>
+                                        </p:tgtEl>
+                                        <p:attrNameLst>
+                                          <p:attrName>style.visibility</p:attrName>
+                                        </p:attrNameLst>
+                                      </p:cBhvr>
+                                      <p:to>
+                                        <p:strVal val="visible"/>
+                                      </p:to>
+                                    </p:set>
+                                  </p:childTnLst>
+                                </p:cTn>
+                              </p:par>
+                            </p:childTnLst>
+                          </p:cTn>
+                        </p:par>
+                      </p:childTnLst>
+                    </p:cTn>
+                  </p:par>
+                  <p:par>
+                    <p:cTn id="15" fill="hold">
+                      <p:stCondLst>
+                        <p:cond delay="indefinite"/>
+                      </p:stCondLst>
+                      <p:childTnLst>
+                        <p:par>
+                          <p:cTn id="16" fill="hold">
+                            <p:stCondLst>
+                              <p:cond delay="0"/>
+                            </p:stCondLst>
+                            <p:childTnLst>
+                              <p:par>
+                                <p:cTn id="17" presetID="1" presetClass="entr" presetSubtype="0" fill="hold" grpId="0" nodeType="clickEffect">
+                                  <p:stCondLst>
+                                    <p:cond delay="0"/>
+                                  </p:stCondLst>
+                                  <p:childTnLst>
+                                    <p:set>
+                                      <p:cBhvr>
+                                        <p:cTn id="18" dur="1" fill="hold">
+                                          <p:stCondLst>
+                                            <p:cond delay="0"/>
+                                          </p:stCondLst>
+                                        </p:cTn>
+                                        <p:tgtEl>
+                                          <p:spTgt spid="3">
+                                            <p:txEl>
+                                              <p:pRg st="4" end="4"/>
+                                            </p:txEl>
+                                          </p:spTgt>
+                                        </p:tgtEl>
+                                        <p:attrNameLst>
+                                          <p:attrName>style.visibility</p:attrName>
+                                        </p:attrNameLst>
+                                      </p:cBhvr>
+                                      <p:to>
+                                        <p:strVal val="visible"/>
+                                      </p:to>
+                                    </p:set>
+                                  </p:childTnLst>
+                                </p:cTn>
+                              </p:par>
+                              <p:par>
+                                <p:cTn id="19" presetID="1" presetClass="entr" presetSubtype="0" fill="hold" grpId="0" nodeType="withEffect">
+                                  <p:stCondLst>
+                                    <p:cond delay="0"/>
+                                  </p:stCondLst>
+                                  <p:childTnLst>
+                                    <p:set>
+                                      <p:cBhvr>
+                                        <p:cTn id="20" dur="1" fill="hold">
+                                          <p:stCondLst>
+                                            <p:cond delay="0"/>
+                                          </p:stCondLst>
+                                        </p:cTn>
+                                        <p:tgtEl>
+                                          <p:spTgt spid="3">
+                                            <p:txEl>
+                                              <p:pRg st="5" end="5"/>
+                                            </p:txEl>
+                                          </p:spTgt>
+                                        </p:tgtEl>
+                                        <p:attrNameLst>
+                                          <p:attrName>style.visibility</p:attrName>
+                                        </p:attrNameLst>
+                                      </p:cBhvr>
+                                      <p:to>
+                                        <p:strVal val="visible"/>
+                                      </p:to>
+                                    </p:set>
+                                  </p:childTnLst>
+                                </p:cTn>
+                              </p:par>
+                              <p:par>
+                                <p:cTn id="21" presetID="1" presetClass="entr" presetSubtype="0" fill="hold" grpId="0" nodeType="withEffect">
+                                  <p:stCondLst>
+                                    <p:cond delay="0"/>
+                                  </p:stCondLst>
+                                  <p:childTnLst>
+                                    <p:set>
+                                      <p:cBhvr>
+                                        <p:cTn id="22" dur="1" fill="hold">
+                                          <p:stCondLst>
+                                            <p:cond delay="0"/>
+                                          </p:stCondLst>
+                                        </p:cTn>
+                                        <p:tgtEl>
+                                          <p:spTgt spid="5"/>
+                                        </p:tgtEl>
+                                        <p:attrNameLst>
+                                          <p:attrName>style.visibility</p:attrName>
+                                        </p:attrNameLst>
+                                      </p:cBhvr>
+                                      <p:to>
+                                        <p:strVal val="visible"/>
+                                      </p:to>
+                                    </p:set>
+                                  </p:childTnLst>
+                                </p:cTn>
+                              </p:par>
+                            </p:childTnLst>
+                          </p:cTn>
+                        </p:par>
+                      </p:childTnLst>
+                    </p:cTn>
+                  </p:par>
+                  <p:par>
+                    <p:cTn id="23" fill="hold">
+                      <p:stCondLst>
+                        <p:cond delay="indefinite"/>
+                      </p:stCondLst>
+                      <p:childTnLst>
+                        <p:par>
+                          <p:cTn id="24" fill="hold">
+                            <p:stCondLst>
+                              <p:cond delay="0"/>
+                            </p:stCondLst>
+                            <p:childTnLst>
+                              <p:par>
+                                <p:cTn id="25" presetID="1" presetClass="entr" presetSubtype="0" fill="hold" grpId="0" nodeType="clickEffect">
+                                  <p:stCondLst>
+                                    <p:cond delay="0"/>
+                                  </p:stCondLst>
+                                  <p:childTnLst>
+                                    <p:set>
+                                      <p:cBhvr>
+                                        <p:cTn id="26" dur="1" fill="hold">
+                                          <p:stCondLst>
+                                            <p:cond delay="0"/>
+                                          </p:stCondLst>
+                                        </p:cTn>
+                                        <p:tgtEl>
+                                          <p:spTgt spid="3">
+                                            <p:txEl>
+                                              <p:pRg st="7" end="7"/>
+                                            </p:txEl>
+                                          </p:spTgt>
+                                        </p:tgtEl>
+                                        <p:attrNameLst>
+                                          <p:attrName>style.visibility</p:attrName>
+                                        </p:attrNameLst>
+                                      </p:cBhvr>
+                                      <p:to>
+                                        <p:strVal val="visible"/>
+                                      </p:to>
+                                    </p:set>
+                                  </p:childTnLst>
+                                </p:cTn>
+                              </p:par>
+                              <p:par>
+                                <p:cTn id="27" presetID="1" presetClass="entr" presetSubtype="0" fill="hold" grpId="0" nodeType="withEffect">
+                                  <p:stCondLst>
+                                    <p:cond delay="0"/>
+                                  </p:stCondLst>
+                                  <p:childTnLst>
+                                    <p:set>
+                                      <p:cBhvr>
+                                        <p:cTn id="28" dur="1" fill="hold">
+                                          <p:stCondLst>
+                                            <p:cond delay="0"/>
+                                          </p:stCondLst>
+                                        </p:cTn>
+                                        <p:tgtEl>
+                                          <p:spTgt spid="6"/>
+                                        </p:tgtEl>
+                                        <p:attrNameLst>
+                                          <p:attrName>style.visibility</p:attrName>
+                                        </p:attrNameLst>
+                                      </p:cBhvr>
+                                      <p:to>
+                                        <p:strVal val="visible"/>
+                                      </p:to>
+                                    </p:set>
+                                  </p:childTnLst>
+                                </p:cTn>
+                              </p:par>
+                            </p:childTnLst>
+                          </p:cTn>
+                        </p:par>
+                      </p:childTnLst>
+                    </p:cTn>
+                  </p:par>
+                </p:childTnLst>
+              </p:cTn>
+              <p:prevCondLst>
+                <p:cond evt="onPrev" delay="0">
+                  <p:tgtEl>
+                    <p:sldTgt/>
+                  </p:tgtEl>
+                </p:cond>
+              </p:prevCondLst>
+              <p:nextCondLst>
+                <p:cond evt="onNext" delay="0">
+                  <p:tgtEl>
+                    <p:sldTgt/>
+                  </p:tgtEl>
+                </p:cond>
+              </p:nextCondLst>
+            </p:seq>
+          </p:childTnLst>
+        </p:cTn>
+      </p:par>
+    </p:tnLst>
+    <p:bldLst>
+      <p:bldP spid="3" grpId="0" uiExpand="1" build="p"/>
+      <p:bldP spid="5" grpId="0" animBg="1"/>
+      <p:bldP spid="6" grpId="0" animBg="1"/>
+    </p:bldLst>
+  </p:timing>
+</p:sld>
+</file>
+
+<file path=ppt/slides/slide12.xml><?xml version="1.0" encoding="utf-8"?>
+<p:sld xmlns:a="http://schemas.openxmlformats.org/drawingml/2006/main" xmlns:r="http://schemas.openxmlformats.org/officeDocument/2006/relationships" xmlns:p="http://schemas.openxmlformats.org/presentationml/2006/main">
+  <p:cSld>
+    <p:spTree>
+      <p:nvGrpSpPr>
+        <p:cNvPr id="1" name=""/>
+        <p:cNvGrpSpPr/>
+        <p:nvPr/>
+      </p:nvGrpSpPr>
+      <p:grpSpPr>
+        <a:xfrm>
+          <a:off x="0" y="0"/>
+          <a:ext cx="0" cy="0"/>
+          <a:chOff x="0" y="0"/>
+          <a:chExt cx="0" cy="0"/>
+        </a:xfrm>
+      </p:grpSpPr>
+      <p:sp>
+        <p:nvSpPr>
+          <p:cNvPr id="2" name="Title 1"/>
+          <p:cNvSpPr>
+            <a:spLocks noGrp="1"/>
+          </p:cNvSpPr>
+          <p:nvPr>
+            <p:ph type="title"/>
+          </p:nvPr>
+        </p:nvSpPr>
+        <p:spPr/>
+        <p:txBody>
+          <a:bodyPr/>
+          <a:lstStyle/>
+          <a:p>
+            <a:r>
+              <a:rPr lang="en-US" dirty="0" smtClean="0"/>
+              <a:t>Task: data transformation</a:t>
+            </a:r>
+            <a:endParaRPr lang="en-US" dirty="0"/>
+          </a:p>
+        </p:txBody>
+      </p:sp>
+      <p:sp>
+        <p:nvSpPr>
+          <p:cNvPr id="3" name="Content Placeholder 2"/>
+          <p:cNvSpPr>
+            <a:spLocks noGrp="1"/>
+          </p:cNvSpPr>
+          <p:nvPr>
+            <p:ph idx="1"/>
+          </p:nvPr>
+        </p:nvSpPr>
+        <p:spPr/>
+        <p:txBody>
+          <a:bodyPr/>
+          <a:lstStyle/>
+          <a:p>
+            <a:r>
+              <a:rPr lang="en-US" dirty="0" smtClean="0"/>
+              <a:t>File </a:t>
+            </a:r>
+            <a:r>
+              <a:rPr lang="en-US" dirty="0" smtClean="0">
+                <a:latin typeface="Courier New" panose="02070309020205020404" pitchFamily="49" charset="0"/>
+                <a:cs typeface="Courier New" panose="02070309020205020404" pitchFamily="49" charset="0"/>
+              </a:rPr>
+              <a:t>data.txt</a:t>
+            </a:r>
+            <a:r>
+              <a:rPr lang="en-US" dirty="0" smtClean="0"/>
+              <a:t> contains coordinates in 2D, compute distance from origin, write to </a:t>
+            </a:r>
+            <a:r>
+              <a:rPr lang="en-US" dirty="0" smtClean="0">
+                <a:latin typeface="Courier New" panose="02070309020205020404" pitchFamily="49" charset="0"/>
+                <a:cs typeface="Courier New" panose="02070309020205020404" pitchFamily="49" charset="0"/>
+              </a:rPr>
+              <a:t>out.txt</a:t>
+            </a:r>
+          </a:p>
+          <a:p>
+            <a:endParaRPr lang="en-US" dirty="0">
+              <a:latin typeface="Courier New" panose="02070309020205020404" pitchFamily="49" charset="0"/>
+              <a:cs typeface="Courier New" panose="02070309020205020404" pitchFamily="49" charset="0"/>
+            </a:endParaRPr>
+          </a:p>
+          <a:p>
+            <a:endParaRPr lang="en-US" dirty="0" smtClean="0">
+              <a:latin typeface="Courier New" panose="02070309020205020404" pitchFamily="49" charset="0"/>
+              <a:cs typeface="Courier New" panose="02070309020205020404" pitchFamily="49" charset="0"/>
+            </a:endParaRPr>
+          </a:p>
+          <a:p>
+            <a:endParaRPr lang="en-US" dirty="0">
+              <a:latin typeface="Courier New" panose="02070309020205020404" pitchFamily="49" charset="0"/>
+              <a:cs typeface="Courier New" panose="02070309020205020404" pitchFamily="49" charset="0"/>
+            </a:endParaRPr>
+          </a:p>
+          <a:p>
+            <a:endParaRPr lang="en-US" dirty="0">
+              <a:cs typeface="Courier New" panose="02070309020205020404" pitchFamily="49" charset="0"/>
+            </a:endParaRPr>
+          </a:p>
+        </p:txBody>
+      </p:sp>
+      <p:sp>
+        <p:nvSpPr>
+          <p:cNvPr id="4" name="Slide Number Placeholder 3"/>
+          <p:cNvSpPr>
+            <a:spLocks noGrp="1"/>
+          </p:cNvSpPr>
+          <p:nvPr>
+            <p:ph type="sldNum" sz="quarter" idx="12"/>
+          </p:nvPr>
+        </p:nvSpPr>
+        <p:spPr/>
+        <p:txBody>
+          <a:bodyPr/>
+          <a:lstStyle/>
+          <a:p>
+            <a:fld id="{033373DF-BCDA-4600-B448-AFBDB22F4A39}" type="slidenum">
+              <a:rPr lang="en-US" smtClean="0"/>
+              <a:t>12</a:t>
             </a:fld>
             <a:endParaRPr lang="en-US"/>
           </a:p>
@@ -5410,7 +6107,7 @@
 </p:sld>
 </file>
 
-<file path=ppt/slides/slide12.xml><?xml version="1.0" encoding="utf-8"?>
+<file path=ppt/slides/slide13.xml><?xml version="1.0" encoding="utf-8"?>
 <p:sld xmlns:a="http://schemas.openxmlformats.org/drawingml/2006/main" xmlns:r="http://schemas.openxmlformats.org/officeDocument/2006/relationships" xmlns:p="http://schemas.openxmlformats.org/presentationml/2006/main">
   <p:cSld>
     <p:spTree>
@@ -5524,7 +6221,7 @@
           <a:p>
             <a:fld id="{033373DF-BCDA-4600-B448-AFBDB22F4A39}" type="slidenum">
               <a:rPr lang="en-US" smtClean="0"/>
-              <a:t>12</a:t>
+              <a:t>13</a:t>
             </a:fld>
             <a:endParaRPr lang="en-US"/>
           </a:p>
@@ -7181,7 +7878,7 @@
 </p:sld>
 </file>
 
-<file path=ppt/slides/slide13.xml><?xml version="1.0" encoding="utf-8"?>
+<file path=ppt/slides/slide14.xml><?xml version="1.0" encoding="utf-8"?>
 <p:sld xmlns:a="http://schemas.openxmlformats.org/drawingml/2006/main" xmlns:r="http://schemas.openxmlformats.org/officeDocument/2006/relationships" xmlns:p="http://schemas.openxmlformats.org/presentationml/2006/main">
   <p:cSld>
     <p:spTree>
@@ -7238,7 +7935,7 @@
           <a:p>
             <a:fld id="{033373DF-BCDA-4600-B448-AFBDB22F4A39}" type="slidenum">
               <a:rPr lang="en-US" smtClean="0"/>
-              <a:t>13</a:t>
+              <a:t>14</a:t>
             </a:fld>
             <a:endParaRPr lang="en-US"/>
           </a:p>
@@ -7427,10 +8124,6 @@
               </a:rPr>
               <a:t>…</a:t>
             </a:r>
-            <a:endParaRPr lang="en-US" sz="1600" dirty="0" smtClean="0">
-              <a:latin typeface="Courier New" pitchFamily="49" charset="0"/>
-              <a:cs typeface="Courier New" pitchFamily="49" charset="0"/>
-            </a:endParaRPr>
           </a:p>
           <a:p>
             <a:r>
@@ -8393,7 +9086,7 @@
 </p:sld>
 </file>
 
-<file path=ppt/slides/slide14.xml><?xml version="1.0" encoding="utf-8"?>
+<file path=ppt/slides/slide15.xml><?xml version="1.0" encoding="utf-8"?>
 <p:sld xmlns:a="http://schemas.openxmlformats.org/drawingml/2006/main" xmlns:r="http://schemas.openxmlformats.org/officeDocument/2006/relationships" xmlns:p="http://schemas.openxmlformats.org/presentationml/2006/main">
   <p:cSld>
     <p:spTree>
@@ -8557,7 +9250,7 @@
           <a:p>
             <a:fld id="{033373DF-BCDA-4600-B448-AFBDB22F4A39}" type="slidenum">
               <a:rPr lang="en-US" smtClean="0"/>
-              <a:t>14</a:t>
+              <a:t>15</a:t>
             </a:fld>
             <a:endParaRPr lang="en-US"/>
           </a:p>
@@ -8815,10 +9508,6 @@
               </a:rPr>
               <a:t>       result *= n--;</a:t>
             </a:r>
-            <a:endParaRPr lang="en-US" sz="1600" dirty="0" smtClean="0">
-              <a:latin typeface="Courier New" pitchFamily="49" charset="0"/>
-              <a:cs typeface="Courier New" pitchFamily="49" charset="0"/>
-            </a:endParaRPr>
           </a:p>
           <a:p>
             <a:r>
@@ -8923,10 +9612,6 @@
               </a:rPr>
               <a:t> a {3};</a:t>
             </a:r>
-            <a:endParaRPr lang="en-US" sz="1600" dirty="0" smtClean="0">
-              <a:latin typeface="Courier New" pitchFamily="49" charset="0"/>
-              <a:cs typeface="Courier New" pitchFamily="49" charset="0"/>
-            </a:endParaRPr>
           </a:p>
           <a:p>
             <a:r>
@@ -9659,7 +10344,7 @@
 </p:sld>
 </file>
 
-<file path=ppt/slides/slide15.xml><?xml version="1.0" encoding="utf-8"?>
+<file path=ppt/slides/slide16.xml><?xml version="1.0" encoding="utf-8"?>
 <p:sld xmlns:a="http://schemas.openxmlformats.org/drawingml/2006/main" xmlns:r="http://schemas.openxmlformats.org/officeDocument/2006/relationships" xmlns:p="http://schemas.openxmlformats.org/presentationml/2006/main">
   <p:cSld>
     <p:spTree>
@@ -9739,7 +10424,7 @@
           <a:p>
             <a:fld id="{033373DF-BCDA-4600-B448-AFBDB22F4A39}" type="slidenum">
               <a:rPr lang="en-US" smtClean="0"/>
-              <a:t>15</a:t>
+              <a:t>16</a:t>
             </a:fld>
             <a:endParaRPr lang="en-US"/>
           </a:p>
@@ -9811,10 +10496,6 @@
               </a:rPr>
               <a:t> a {3};</a:t>
             </a:r>
-            <a:endParaRPr lang="en-US" sz="1600" dirty="0" smtClean="0">
-              <a:latin typeface="Courier New" pitchFamily="49" charset="0"/>
-              <a:cs typeface="Courier New" pitchFamily="49" charset="0"/>
-            </a:endParaRPr>
           </a:p>
           <a:p>
             <a:r>
@@ -10152,10 +10833,6 @@
               </a:rPr>
               <a:t> x {3.5};</a:t>
             </a:r>
-            <a:endParaRPr lang="en-US" sz="1600" dirty="0" smtClean="0">
-              <a:latin typeface="Courier New" pitchFamily="49" charset="0"/>
-              <a:cs typeface="Courier New" pitchFamily="49" charset="0"/>
-            </a:endParaRPr>
           </a:p>
           <a:p>
             <a:r>
@@ -10275,17 +10952,7 @@
                 <a:latin typeface="Courier New" pitchFamily="49" charset="0"/>
                 <a:cs typeface="Courier New" pitchFamily="49" charset="0"/>
               </a:rPr>
-              <a:t>double</a:t>
-            </a:r>
-            <a:r>
-              <a:rPr lang="en-US" sz="1600" b="1" dirty="0" smtClean="0">
-                <a:solidFill>
-                  <a:srgbClr val="00B050"/>
-                </a:solidFill>
-                <a:latin typeface="Courier New" pitchFamily="49" charset="0"/>
-                <a:cs typeface="Courier New" pitchFamily="49" charset="0"/>
-              </a:rPr>
-              <a:t>&amp;</a:t>
+              <a:t>double&amp;</a:t>
             </a:r>
             <a:r>
               <a:rPr lang="en-US" sz="1600" dirty="0" smtClean="0">
@@ -10575,7 +11242,7 @@
 </p:sld>
 </file>
 
-<file path=ppt/slides/slide16.xml><?xml version="1.0" encoding="utf-8"?>
+<file path=ppt/slides/slide17.xml><?xml version="1.0" encoding="utf-8"?>
 <p:sld xmlns:a="http://schemas.openxmlformats.org/drawingml/2006/main" xmlns:r="http://schemas.openxmlformats.org/officeDocument/2006/relationships" xmlns:p="http://schemas.openxmlformats.org/presentationml/2006/main">
   <p:cSld>
     <p:spTree>
@@ -10655,7 +11322,7 @@
           <a:p>
             <a:fld id="{033373DF-BCDA-4600-B448-AFBDB22F4A39}" type="slidenum">
               <a:rPr lang="en-US" smtClean="0"/>
-              <a:t>16</a:t>
+              <a:t>17</a:t>
             </a:fld>
             <a:endParaRPr lang="en-US"/>
           </a:p>
@@ -11117,7 +11784,7 @@
           <a:graphicData uri="http://schemas.openxmlformats.org/presentationml/2006/ole">
             <mc:AlternateContent xmlns:mc="http://schemas.openxmlformats.org/markup-compatibility/2006">
               <mc:Choice xmlns:v="urn:schemas-microsoft-com:vml" Requires="v">
-                <p:oleObj spid="_x0000_s2065" name="Equation" r:id="rId3" imgW="1485720" imgH="609480" progId="Equation.3">
+                <p:oleObj spid="_x0000_s2069" name="Equation" r:id="rId3" imgW="1485720" imgH="609480" progId="Equation.3">
                   <p:embed/>
                 </p:oleObj>
               </mc:Choice>
@@ -11290,7 +11957,7 @@
 </p:sld>
 </file>
 
-<file path=ppt/slides/slide17.xml><?xml version="1.0" encoding="utf-8"?>
+<file path=ppt/slides/slide18.xml><?xml version="1.0" encoding="utf-8"?>
 <p:sld xmlns:a="http://schemas.openxmlformats.org/drawingml/2006/main" xmlns:r="http://schemas.openxmlformats.org/officeDocument/2006/relationships" xmlns:p="http://schemas.openxmlformats.org/presentationml/2006/main">
   <p:cSld>
     <p:spTree>
@@ -11347,7 +12014,7 @@
           <a:p>
             <a:fld id="{033373DF-BCDA-4600-B448-AFBDB22F4A39}" type="slidenum">
               <a:rPr lang="en-US" smtClean="0"/>
-              <a:t>17</a:t>
+              <a:t>18</a:t>
             </a:fld>
             <a:endParaRPr lang="en-US"/>
           </a:p>
@@ -11950,7 +12617,7 @@
 </p:sld>
 </file>
 
-<file path=ppt/slides/slide18.xml><?xml version="1.0" encoding="utf-8"?>
+<file path=ppt/slides/slide19.xml><?xml version="1.0" encoding="utf-8"?>
 <p:sld xmlns:a="http://schemas.openxmlformats.org/drawingml/2006/main" xmlns:r="http://schemas.openxmlformats.org/officeDocument/2006/relationships" xmlns:p="http://schemas.openxmlformats.org/presentationml/2006/main">
   <p:cSld>
     <p:spTree>
@@ -12103,7 +12770,7 @@
           <a:p>
             <a:fld id="{033373DF-BCDA-4600-B448-AFBDB22F4A39}" type="slidenum">
               <a:rPr lang="en-US" smtClean="0"/>
-              <a:t>18</a:t>
+              <a:t>19</a:t>
             </a:fld>
             <a:endParaRPr lang="en-US"/>
           </a:p>
@@ -13272,7 +13939,201 @@
 </p:sld>
 </file>
 
-<file path=ppt/slides/slide19.xml><?xml version="1.0" encoding="utf-8"?>
+<file path=ppt/slides/slide2.xml><?xml version="1.0" encoding="utf-8"?>
+<p:sld xmlns:a="http://schemas.openxmlformats.org/drawingml/2006/main" xmlns:r="http://schemas.openxmlformats.org/officeDocument/2006/relationships" xmlns:p="http://schemas.openxmlformats.org/presentationml/2006/main">
+  <p:cSld>
+    <p:spTree>
+      <p:nvGrpSpPr>
+        <p:cNvPr id="1" name=""/>
+        <p:cNvGrpSpPr/>
+        <p:nvPr/>
+      </p:nvGrpSpPr>
+      <p:grpSpPr>
+        <a:xfrm>
+          <a:off x="0" y="0"/>
+          <a:ext cx="0" cy="0"/>
+          <a:chOff x="0" y="0"/>
+          <a:chExt cx="0" cy="0"/>
+        </a:xfrm>
+      </p:grpSpPr>
+      <p:sp>
+        <p:nvSpPr>
+          <p:cNvPr id="2" name="Slide Number Placeholder 1"/>
+          <p:cNvSpPr>
+            <a:spLocks noGrp="1"/>
+          </p:cNvSpPr>
+          <p:nvPr>
+            <p:ph type="sldNum" sz="quarter" idx="12"/>
+          </p:nvPr>
+        </p:nvSpPr>
+        <p:spPr/>
+        <p:txBody>
+          <a:bodyPr/>
+          <a:lstStyle/>
+          <a:p>
+            <a:fld id="{033373DF-BCDA-4600-B448-AFBDB22F4A39}" type="slidenum">
+              <a:rPr lang="en-US" smtClean="0"/>
+              <a:t>2</a:t>
+            </a:fld>
+            <a:endParaRPr lang="en-US"/>
+          </a:p>
+        </p:txBody>
+      </p:sp>
+      <p:sp>
+        <p:nvSpPr>
+          <p:cNvPr id="3" name="TextBox 2"/>
+          <p:cNvSpPr txBox="1"/>
+          <p:nvPr/>
+        </p:nvSpPr>
+        <p:spPr>
+          <a:xfrm>
+            <a:off x="1193194" y="2423057"/>
+            <a:ext cx="3404137" cy="1692771"/>
+          </a:xfrm>
+          <a:prstGeom prst="rect">
+            <a:avLst/>
+          </a:prstGeom>
+          <a:noFill/>
+          <a:ln>
+            <a:solidFill>
+              <a:schemeClr val="tx1"/>
+            </a:solidFill>
+          </a:ln>
+        </p:spPr>
+        <p:txBody>
+          <a:bodyPr wrap="none" rtlCol="0">
+            <a:spAutoFit/>
+          </a:bodyPr>
+          <a:lstStyle/>
+          <a:p>
+            <a:r>
+              <a:rPr lang="en-US" dirty="0"/>
+              <a:t>Presentation based on:</a:t>
+            </a:r>
+            <a:br>
+              <a:rPr lang="en-US" dirty="0"/>
+            </a:br>
+            <a:r>
+              <a:rPr lang="en-US" sz="2800" i="1" dirty="0"/>
+              <a:t>A tour of C++</a:t>
+            </a:r>
+            <a:r>
+              <a:rPr lang="en-US" sz="2800" dirty="0"/>
+              <a:t/>
+            </a:r>
+            <a:br>
+              <a:rPr lang="en-US" sz="2800" dirty="0"/>
+            </a:br>
+            <a:r>
+              <a:rPr lang="en-US" sz="2800" dirty="0"/>
+              <a:t>Bjarne </a:t>
+            </a:r>
+            <a:r>
+              <a:rPr lang="en-US" sz="2800" dirty="0" err="1"/>
+              <a:t>Stroustrup</a:t>
+            </a:r>
+            <a:endParaRPr lang="en-US" sz="2800" dirty="0"/>
+          </a:p>
+          <a:p>
+            <a:r>
+              <a:rPr lang="en-US" sz="2800" dirty="0"/>
+              <a:t>Addison-Wesley, 2014</a:t>
+            </a:r>
+          </a:p>
+        </p:txBody>
+      </p:sp>
+    </p:spTree>
+    <p:extLst>
+      <p:ext uri="{BB962C8B-B14F-4D97-AF65-F5344CB8AC3E}">
+        <p14:creationId xmlns:p14="http://schemas.microsoft.com/office/powerpoint/2010/main" val="4086482214"/>
+      </p:ext>
+    </p:extLst>
+  </p:cSld>
+  <p:clrMapOvr>
+    <a:masterClrMapping/>
+  </p:clrMapOvr>
+  <p:timing>
+    <p:tnLst>
+      <p:par>
+        <p:cTn id="1" dur="indefinite" restart="never" nodeType="tmRoot">
+          <p:childTnLst>
+            <p:seq concurrent="1" nextAc="seek">
+              <p:cTn id="2" dur="indefinite" nodeType="mainSeq">
+                <p:childTnLst>
+                  <p:par>
+                    <p:cTn id="3" fill="hold">
+                      <p:stCondLst>
+                        <p:cond delay="indefinite"/>
+                      </p:stCondLst>
+                      <p:childTnLst>
+                        <p:par>
+                          <p:cTn id="4" fill="hold">
+                            <p:stCondLst>
+                              <p:cond delay="0"/>
+                            </p:stCondLst>
+                            <p:childTnLst>
+                              <p:par>
+                                <p:cTn id="5" presetID="1" presetClass="entr" presetSubtype="0" fill="hold" grpId="0" nodeType="clickEffect">
+                                  <p:stCondLst>
+                                    <p:cond delay="0"/>
+                                  </p:stCondLst>
+                                  <p:childTnLst>
+                                    <p:set>
+                                      <p:cBhvr>
+                                        <p:cTn id="6" dur="1" fill="hold">
+                                          <p:stCondLst>
+                                            <p:cond delay="0"/>
+                                          </p:stCondLst>
+                                        </p:cTn>
+                                        <p:tgtEl>
+                                          <p:spTgt spid="3"/>
+                                        </p:tgtEl>
+                                        <p:attrNameLst>
+                                          <p:attrName>style.visibility</p:attrName>
+                                        </p:attrNameLst>
+                                      </p:cBhvr>
+                                      <p:to>
+                                        <p:strVal val="visible"/>
+                                      </p:to>
+                                    </p:set>
+                                  </p:childTnLst>
+                                </p:cTn>
+                              </p:par>
+                            </p:childTnLst>
+                          </p:cTn>
+                        </p:par>
+                      </p:childTnLst>
+                    </p:cTn>
+                  </p:par>
+                </p:childTnLst>
+              </p:cTn>
+              <p:prevCondLst>
+                <p:cond evt="onPrev" delay="0">
+                  <p:tgtEl>
+                    <p:sldTgt/>
+                  </p:tgtEl>
+                </p:cond>
+              </p:prevCondLst>
+              <p:nextCondLst>
+                <p:cond evt="onNext" delay="0">
+                  <p:tgtEl>
+                    <p:sldTgt/>
+                  </p:tgtEl>
+                </p:cond>
+              </p:nextCondLst>
+            </p:seq>
+          </p:childTnLst>
+        </p:cTn>
+      </p:par>
+    </p:tnLst>
+    <p:bldLst>
+      <p:bldP spid="3" grpId="0" animBg="1"/>
+    </p:bldLst>
+  </p:timing>
+</p:sld>
+</file>
+
+<file path=ppt/slides/slide20.xml><?xml version="1.0" encoding="utf-8"?>
 <p:sld xmlns:a="http://schemas.openxmlformats.org/drawingml/2006/main" xmlns:r="http://schemas.openxmlformats.org/officeDocument/2006/relationships" xmlns:p="http://schemas.openxmlformats.org/presentationml/2006/main">
   <p:cSld>
     <p:spTree>
@@ -13501,7 +14362,7 @@
           <a:p>
             <a:fld id="{033373DF-BCDA-4600-B448-AFBDB22F4A39}" type="slidenum">
               <a:rPr lang="en-US" smtClean="0"/>
-              <a:t>19</a:t>
+              <a:t>20</a:t>
             </a:fld>
             <a:endParaRPr lang="en-US"/>
           </a:p>
@@ -13913,201 +14774,7 @@
 </p:sld>
 </file>
 
-<file path=ppt/slides/slide2.xml><?xml version="1.0" encoding="utf-8"?>
-<p:sld xmlns:a="http://schemas.openxmlformats.org/drawingml/2006/main" xmlns:r="http://schemas.openxmlformats.org/officeDocument/2006/relationships" xmlns:p="http://schemas.openxmlformats.org/presentationml/2006/main">
-  <p:cSld>
-    <p:spTree>
-      <p:nvGrpSpPr>
-        <p:cNvPr id="1" name=""/>
-        <p:cNvGrpSpPr/>
-        <p:nvPr/>
-      </p:nvGrpSpPr>
-      <p:grpSpPr>
-        <a:xfrm>
-          <a:off x="0" y="0"/>
-          <a:ext cx="0" cy="0"/>
-          <a:chOff x="0" y="0"/>
-          <a:chExt cx="0" cy="0"/>
-        </a:xfrm>
-      </p:grpSpPr>
-      <p:sp>
-        <p:nvSpPr>
-          <p:cNvPr id="2" name="Slide Number Placeholder 1"/>
-          <p:cNvSpPr>
-            <a:spLocks noGrp="1"/>
-          </p:cNvSpPr>
-          <p:nvPr>
-            <p:ph type="sldNum" sz="quarter" idx="12"/>
-          </p:nvPr>
-        </p:nvSpPr>
-        <p:spPr/>
-        <p:txBody>
-          <a:bodyPr/>
-          <a:lstStyle/>
-          <a:p>
-            <a:fld id="{033373DF-BCDA-4600-B448-AFBDB22F4A39}" type="slidenum">
-              <a:rPr lang="en-US" smtClean="0"/>
-              <a:t>2</a:t>
-            </a:fld>
-            <a:endParaRPr lang="en-US"/>
-          </a:p>
-        </p:txBody>
-      </p:sp>
-      <p:sp>
-        <p:nvSpPr>
-          <p:cNvPr id="3" name="TextBox 2"/>
-          <p:cNvSpPr txBox="1"/>
-          <p:nvPr/>
-        </p:nvSpPr>
-        <p:spPr>
-          <a:xfrm>
-            <a:off x="1193194" y="2423057"/>
-            <a:ext cx="3404137" cy="1692771"/>
-          </a:xfrm>
-          <a:prstGeom prst="rect">
-            <a:avLst/>
-          </a:prstGeom>
-          <a:noFill/>
-          <a:ln>
-            <a:solidFill>
-              <a:schemeClr val="tx1"/>
-            </a:solidFill>
-          </a:ln>
-        </p:spPr>
-        <p:txBody>
-          <a:bodyPr wrap="none" rtlCol="0">
-            <a:spAutoFit/>
-          </a:bodyPr>
-          <a:lstStyle/>
-          <a:p>
-            <a:r>
-              <a:rPr lang="en-US" dirty="0"/>
-              <a:t>Presentation based on:</a:t>
-            </a:r>
-            <a:br>
-              <a:rPr lang="en-US" dirty="0"/>
-            </a:br>
-            <a:r>
-              <a:rPr lang="en-US" sz="2800" i="1" dirty="0"/>
-              <a:t>A tour of C++</a:t>
-            </a:r>
-            <a:r>
-              <a:rPr lang="en-US" sz="2800" dirty="0"/>
-              <a:t/>
-            </a:r>
-            <a:br>
-              <a:rPr lang="en-US" sz="2800" dirty="0"/>
-            </a:br>
-            <a:r>
-              <a:rPr lang="en-US" sz="2800" dirty="0"/>
-              <a:t>Bjarne </a:t>
-            </a:r>
-            <a:r>
-              <a:rPr lang="en-US" sz="2800" dirty="0" err="1"/>
-              <a:t>Stroustrup</a:t>
-            </a:r>
-            <a:endParaRPr lang="en-US" sz="2800" dirty="0"/>
-          </a:p>
-          <a:p>
-            <a:r>
-              <a:rPr lang="en-US" sz="2800" dirty="0"/>
-              <a:t>Addison-Wesley, 2014</a:t>
-            </a:r>
-          </a:p>
-        </p:txBody>
-      </p:sp>
-    </p:spTree>
-    <p:extLst>
-      <p:ext uri="{BB962C8B-B14F-4D97-AF65-F5344CB8AC3E}">
-        <p14:creationId xmlns:p14="http://schemas.microsoft.com/office/powerpoint/2010/main" val="4086482214"/>
-      </p:ext>
-    </p:extLst>
-  </p:cSld>
-  <p:clrMapOvr>
-    <a:masterClrMapping/>
-  </p:clrMapOvr>
-  <p:timing>
-    <p:tnLst>
-      <p:par>
-        <p:cTn id="1" dur="indefinite" restart="never" nodeType="tmRoot">
-          <p:childTnLst>
-            <p:seq concurrent="1" nextAc="seek">
-              <p:cTn id="2" dur="indefinite" nodeType="mainSeq">
-                <p:childTnLst>
-                  <p:par>
-                    <p:cTn id="3" fill="hold">
-                      <p:stCondLst>
-                        <p:cond delay="indefinite"/>
-                      </p:stCondLst>
-                      <p:childTnLst>
-                        <p:par>
-                          <p:cTn id="4" fill="hold">
-                            <p:stCondLst>
-                              <p:cond delay="0"/>
-                            </p:stCondLst>
-                            <p:childTnLst>
-                              <p:par>
-                                <p:cTn id="5" presetID="1" presetClass="entr" presetSubtype="0" fill="hold" grpId="0" nodeType="clickEffect">
-                                  <p:stCondLst>
-                                    <p:cond delay="0"/>
-                                  </p:stCondLst>
-                                  <p:childTnLst>
-                                    <p:set>
-                                      <p:cBhvr>
-                                        <p:cTn id="6" dur="1" fill="hold">
-                                          <p:stCondLst>
-                                            <p:cond delay="0"/>
-                                          </p:stCondLst>
-                                        </p:cTn>
-                                        <p:tgtEl>
-                                          <p:spTgt spid="3"/>
-                                        </p:tgtEl>
-                                        <p:attrNameLst>
-                                          <p:attrName>style.visibility</p:attrName>
-                                        </p:attrNameLst>
-                                      </p:cBhvr>
-                                      <p:to>
-                                        <p:strVal val="visible"/>
-                                      </p:to>
-                                    </p:set>
-                                  </p:childTnLst>
-                                </p:cTn>
-                              </p:par>
-                            </p:childTnLst>
-                          </p:cTn>
-                        </p:par>
-                      </p:childTnLst>
-                    </p:cTn>
-                  </p:par>
-                </p:childTnLst>
-              </p:cTn>
-              <p:prevCondLst>
-                <p:cond evt="onPrev" delay="0">
-                  <p:tgtEl>
-                    <p:sldTgt/>
-                  </p:tgtEl>
-                </p:cond>
-              </p:prevCondLst>
-              <p:nextCondLst>
-                <p:cond evt="onNext" delay="0">
-                  <p:tgtEl>
-                    <p:sldTgt/>
-                  </p:tgtEl>
-                </p:cond>
-              </p:nextCondLst>
-            </p:seq>
-          </p:childTnLst>
-        </p:cTn>
-      </p:par>
-    </p:tnLst>
-    <p:bldLst>
-      <p:bldP spid="3" grpId="0" animBg="1"/>
-    </p:bldLst>
-  </p:timing>
-</p:sld>
-</file>
-
-<file path=ppt/slides/slide20.xml><?xml version="1.0" encoding="utf-8"?>
+<file path=ppt/slides/slide21.xml><?xml version="1.0" encoding="utf-8"?>
 <p:sld xmlns:a="http://schemas.openxmlformats.org/drawingml/2006/main" xmlns:r="http://schemas.openxmlformats.org/officeDocument/2006/relationships" xmlns:p="http://schemas.openxmlformats.org/presentationml/2006/main">
   <p:cSld>
     <p:spTree>
@@ -14263,7 +14930,7 @@
           <a:p>
             <a:fld id="{033373DF-BCDA-4600-B448-AFBDB22F4A39}" type="slidenum">
               <a:rPr lang="en-US" smtClean="0"/>
-              <a:t>20</a:t>
+              <a:t>21</a:t>
             </a:fld>
             <a:endParaRPr lang="en-US"/>
           </a:p>
@@ -15207,7 +15874,7 @@
 </p:sld>
 </file>
 
-<file path=ppt/slides/slide21.xml><?xml version="1.0" encoding="utf-8"?>
+<file path=ppt/slides/slide22.xml><?xml version="1.0" encoding="utf-8"?>
 <p:sld xmlns:a="http://schemas.openxmlformats.org/drawingml/2006/main" xmlns:r="http://schemas.openxmlformats.org/officeDocument/2006/relationships" xmlns:p="http://schemas.openxmlformats.org/presentationml/2006/main">
   <p:cSld>
     <p:spTree>
@@ -15297,7 +15964,7 @@
           <a:p>
             <a:fld id="{033373DF-BCDA-4600-B448-AFBDB22F4A39}" type="slidenum">
               <a:rPr lang="en-US" smtClean="0"/>
-              <a:t>21</a:t>
+              <a:t>22</a:t>
             </a:fld>
             <a:endParaRPr lang="en-US"/>
           </a:p>
@@ -16117,7 +16784,7 @@
 </p:sld>
 </file>
 
-<file path=ppt/slides/slide22.xml><?xml version="1.0" encoding="utf-8"?>
+<file path=ppt/slides/slide23.xml><?xml version="1.0" encoding="utf-8"?>
 <p:sld xmlns:a="http://schemas.openxmlformats.org/drawingml/2006/main" xmlns:r="http://schemas.openxmlformats.org/officeDocument/2006/relationships" xmlns:p="http://schemas.openxmlformats.org/presentationml/2006/main">
   <p:cSld>
     <p:spTree>
@@ -16228,7 +16895,7 @@
           <a:p>
             <a:fld id="{033373DF-BCDA-4600-B448-AFBDB22F4A39}" type="slidenum">
               <a:rPr lang="en-US" smtClean="0"/>
-              <a:t>22</a:t>
+              <a:t>23</a:t>
             </a:fld>
             <a:endParaRPr lang="en-US"/>
           </a:p>
@@ -17349,7 +18016,7 @@
 </p:sld>
 </file>
 
-<file path=ppt/slides/slide23.xml><?xml version="1.0" encoding="utf-8"?>
+<file path=ppt/slides/slide24.xml><?xml version="1.0" encoding="utf-8"?>
 <p:sld xmlns:a="http://schemas.openxmlformats.org/drawingml/2006/main" xmlns:r="http://schemas.openxmlformats.org/officeDocument/2006/relationships" xmlns:p="http://schemas.openxmlformats.org/presentationml/2006/main">
   <p:cSld>
     <p:spTree>
@@ -17446,7 +18113,7 @@
           <a:p>
             <a:fld id="{033373DF-BCDA-4600-B448-AFBDB22F4A39}" type="slidenum">
               <a:rPr lang="en-US" smtClean="0"/>
-              <a:t>23</a:t>
+              <a:t>24</a:t>
             </a:fld>
             <a:endParaRPr lang="en-US"/>
           </a:p>
@@ -18289,7 +18956,7 @@
           <a:graphicData uri="http://schemas.openxmlformats.org/presentationml/2006/ole">
             <mc:AlternateContent xmlns:mc="http://schemas.openxmlformats.org/markup-compatibility/2006">
               <mc:Choice xmlns:v="urn:schemas-microsoft-com:vml" Requires="v">
-                <p:oleObj spid="_x0000_s1056" name="Equation" r:id="rId3" imgW="533160" imgH="431640" progId="Equation.3">
+                <p:oleObj spid="_x0000_s1060" name="Equation" r:id="rId3" imgW="533160" imgH="431640" progId="Equation.3">
                   <p:embed/>
                 </p:oleObj>
               </mc:Choice>
@@ -18795,7 +19462,7 @@
 </p:sld>
 </file>
 
-<file path=ppt/slides/slide24.xml><?xml version="1.0" encoding="utf-8"?>
+<file path=ppt/slides/slide25.xml><?xml version="1.0" encoding="utf-8"?>
 <p:sld xmlns:a="http://schemas.openxmlformats.org/drawingml/2006/main" xmlns:r="http://schemas.openxmlformats.org/officeDocument/2006/relationships" xmlns:p="http://schemas.openxmlformats.org/presentationml/2006/main">
   <p:cSld>
     <p:spTree>
@@ -18875,7 +19542,7 @@
           <a:p>
             <a:fld id="{033373DF-BCDA-4600-B448-AFBDB22F4A39}" type="slidenum">
               <a:rPr lang="en-US" smtClean="0"/>
-              <a:t>24</a:t>
+              <a:t>25</a:t>
             </a:fld>
             <a:endParaRPr lang="en-US"/>
           </a:p>
@@ -19377,7 +20044,7 @@
 </p:sld>
 </file>
 
-<file path=ppt/slides/slide25.xml><?xml version="1.0" encoding="utf-8"?>
+<file path=ppt/slides/slide26.xml><?xml version="1.0" encoding="utf-8"?>
 <p:sld xmlns:a="http://schemas.openxmlformats.org/drawingml/2006/main" xmlns:r="http://schemas.openxmlformats.org/officeDocument/2006/relationships" xmlns:p="http://schemas.openxmlformats.org/presentationml/2006/main">
   <p:cSld>
     <p:spTree>
@@ -19476,7 +20143,7 @@
           <a:p>
             <a:fld id="{033373DF-BCDA-4600-B448-AFBDB22F4A39}" type="slidenum">
               <a:rPr lang="en-US" smtClean="0"/>
-              <a:t>25</a:t>
+              <a:t>26</a:t>
             </a:fld>
             <a:endParaRPr lang="en-US"/>
           </a:p>
@@ -20737,7 +21404,7 @@
 </p:sld>
 </file>
 
-<file path=ppt/slides/slide26.xml><?xml version="1.0" encoding="utf-8"?>
+<file path=ppt/slides/slide27.xml><?xml version="1.0" encoding="utf-8"?>
 <p:sld xmlns:a="http://schemas.openxmlformats.org/drawingml/2006/main" xmlns:r="http://schemas.openxmlformats.org/officeDocument/2006/relationships" xmlns:p="http://schemas.openxmlformats.org/presentationml/2006/main">
   <p:cSld>
     <p:spTree>
@@ -20823,7 +21490,7 @@
           <a:p>
             <a:fld id="{033373DF-BCDA-4600-B448-AFBDB22F4A39}" type="slidenum">
               <a:rPr lang="en-US" smtClean="0"/>
-              <a:t>26</a:t>
+              <a:t>27</a:t>
             </a:fld>
             <a:endParaRPr lang="en-US"/>
           </a:p>
@@ -22095,7 +22762,7 @@
 </p:sld>
 </file>
 
-<file path=ppt/slides/slide27.xml><?xml version="1.0" encoding="utf-8"?>
+<file path=ppt/slides/slide28.xml><?xml version="1.0" encoding="utf-8"?>
 <p:sld xmlns:a="http://schemas.openxmlformats.org/drawingml/2006/main" xmlns:r="http://schemas.openxmlformats.org/officeDocument/2006/relationships" xmlns:p="http://schemas.openxmlformats.org/presentationml/2006/main">
   <p:cSld>
     <p:spTree>
@@ -22152,7 +22819,7 @@
           <a:p>
             <a:fld id="{033373DF-BCDA-4600-B448-AFBDB22F4A39}" type="slidenum">
               <a:rPr lang="en-US" smtClean="0"/>
-              <a:t>27</a:t>
+              <a:t>28</a:t>
             </a:fld>
             <a:endParaRPr lang="en-US"/>
           </a:p>
@@ -22720,15 +23387,7 @@
             <a:p>
               <a:r>
                 <a:rPr lang="en-US" sz="2000" dirty="0" smtClean="0"/>
-                <a:t>array values </a:t>
-              </a:r>
-              <a:r>
-                <a:rPr lang="en-US" sz="2000" dirty="0" smtClean="0"/>
-                <a:t>in</a:t>
-              </a:r>
-              <a:r>
-                <a:rPr lang="en-US" sz="2000" dirty="0" smtClean="0"/>
-                <a:t> </a:t>
+                <a:t>array values in </a:t>
               </a:r>
               <a:r>
                 <a:rPr lang="en-US" sz="2000" dirty="0" smtClean="0">
@@ -28933,15 +29592,7 @@
           <a:p>
             <a:r>
               <a:rPr lang="en-US" dirty="0" smtClean="0"/>
-              <a:t>Value c</a:t>
-            </a:r>
-            <a:r>
-              <a:rPr lang="en-US" dirty="0" smtClean="0"/>
-              <a:t>an </a:t>
-            </a:r>
-            <a:r>
-              <a:rPr lang="en-US" dirty="0" smtClean="0"/>
-              <a:t>change during run</a:t>
+              <a:t>Value can change during run</a:t>
             </a:r>
           </a:p>
           <a:p>
@@ -29394,10 +30045,6 @@
               </a:rPr>
               <a:t>3*m};</a:t>
             </a:r>
-            <a:endParaRPr lang="en-US" sz="1600" dirty="0" smtClean="0">
-              <a:latin typeface="Courier New" pitchFamily="49" charset="0"/>
-              <a:cs typeface="Courier New" pitchFamily="49" charset="0"/>
-            </a:endParaRPr>
           </a:p>
           <a:p>
             <a:r>

</xml_diff>

<commit_message>
Renamed function to avoid trouble when using std namespace
</commit_message>
<xml_diff>
--- a/CPlusPlus/01_essential_cpp_basics.pptx
+++ b/CPlusPlus/01_essential_cpp_basics.pptx
@@ -224,7 +224,7 @@
           <a:p>
             <a:fld id="{959286F1-78EA-4A32-8D12-1F28CCE43A8D}" type="datetimeFigureOut">
               <a:rPr lang="en-US" smtClean="0"/>
-              <a:t>2017-03-05</a:t>
+              <a:t>2017-03-21</a:t>
             </a:fld>
             <a:endParaRPr lang="en-US"/>
           </a:p>
@@ -623,7 +623,7 @@
           <a:p>
             <a:fld id="{7E64AD2A-13EC-46C7-9287-3CACAC3798D5}" type="datetime1">
               <a:rPr lang="en-US" smtClean="0"/>
-              <a:t>2017-03-05</a:t>
+              <a:t>2017-03-21</a:t>
             </a:fld>
             <a:endParaRPr lang="en-US"/>
           </a:p>
@@ -793,7 +793,7 @@
           <a:p>
             <a:fld id="{43AE06E8-3793-4EB5-8012-97A6BFC78375}" type="datetime1">
               <a:rPr lang="en-US" smtClean="0"/>
-              <a:t>2017-03-05</a:t>
+              <a:t>2017-03-21</a:t>
             </a:fld>
             <a:endParaRPr lang="en-US"/>
           </a:p>
@@ -973,7 +973,7 @@
           <a:p>
             <a:fld id="{E234FBB9-2650-4E82-9375-3AD81E2FC1C9}" type="datetime1">
               <a:rPr lang="en-US" smtClean="0"/>
-              <a:t>2017-03-05</a:t>
+              <a:t>2017-03-21</a:t>
             </a:fld>
             <a:endParaRPr lang="en-US"/>
           </a:p>
@@ -1143,7 +1143,7 @@
           <a:p>
             <a:fld id="{913E3CEC-9565-4823-A6C8-B34B815EB4CE}" type="datetime1">
               <a:rPr lang="en-US" smtClean="0"/>
-              <a:t>2017-03-05</a:t>
+              <a:t>2017-03-21</a:t>
             </a:fld>
             <a:endParaRPr lang="en-US"/>
           </a:p>
@@ -1387,7 +1387,7 @@
           <a:p>
             <a:fld id="{F5251CD9-EE9A-4CFE-A7E1-729B5C9F077D}" type="datetime1">
               <a:rPr lang="en-US" smtClean="0"/>
-              <a:t>2017-03-05</a:t>
+              <a:t>2017-03-21</a:t>
             </a:fld>
             <a:endParaRPr lang="en-US"/>
           </a:p>
@@ -1619,7 +1619,7 @@
           <a:p>
             <a:fld id="{9D8A7943-CAAB-4232-A550-28565CC8A736}" type="datetime1">
               <a:rPr lang="en-US" smtClean="0"/>
-              <a:t>2017-03-05</a:t>
+              <a:t>2017-03-21</a:t>
             </a:fld>
             <a:endParaRPr lang="en-US"/>
           </a:p>
@@ -1986,7 +1986,7 @@
           <a:p>
             <a:fld id="{AECA22B3-9CAA-48F4-B0A5-AAC29DCE38BB}" type="datetime1">
               <a:rPr lang="en-US" smtClean="0"/>
-              <a:t>2017-03-05</a:t>
+              <a:t>2017-03-21</a:t>
             </a:fld>
             <a:endParaRPr lang="en-US"/>
           </a:p>
@@ -2104,7 +2104,7 @@
           <a:p>
             <a:fld id="{17BEA515-885F-453F-9DB6-FB7EBDD5269C}" type="datetime1">
               <a:rPr lang="en-US" smtClean="0"/>
-              <a:t>2017-03-05</a:t>
+              <a:t>2017-03-21</a:t>
             </a:fld>
             <a:endParaRPr lang="en-US"/>
           </a:p>
@@ -2199,7 +2199,7 @@
           <a:p>
             <a:fld id="{DF49C002-0A7D-4B38-A829-C7867DEAC314}" type="datetime1">
               <a:rPr lang="en-US" smtClean="0"/>
-              <a:t>2017-03-05</a:t>
+              <a:t>2017-03-21</a:t>
             </a:fld>
             <a:endParaRPr lang="en-US"/>
           </a:p>
@@ -2476,7 +2476,7 @@
           <a:p>
             <a:fld id="{DF81AE77-813F-4EB7-92DB-CEFC7AEFB117}" type="datetime1">
               <a:rPr lang="en-US" smtClean="0"/>
-              <a:t>2017-03-05</a:t>
+              <a:t>2017-03-21</a:t>
             </a:fld>
             <a:endParaRPr lang="en-US"/>
           </a:p>
@@ -2733,7 +2733,7 @@
           <a:p>
             <a:fld id="{C3D8A7DD-E8A7-4B8B-A1C0-3939B552071F}" type="datetime1">
               <a:rPr lang="en-US" smtClean="0"/>
-              <a:t>2017-03-05</a:t>
+              <a:t>2017-03-21</a:t>
             </a:fld>
             <a:endParaRPr lang="en-US"/>
           </a:p>
@@ -2946,7 +2946,7 @@
           <a:p>
             <a:fld id="{0DDF3A26-7F7C-417D-882D-6FCBBDE254C3}" type="datetime1">
               <a:rPr lang="en-US" smtClean="0"/>
-              <a:t>2017-03-05</a:t>
+              <a:t>2017-03-21</a:t>
             </a:fld>
             <a:endParaRPr lang="en-US"/>
           </a:p>
@@ -9558,7 +9558,7 @@
         <p:spPr>
           <a:xfrm>
             <a:off x="4514850" y="2344450"/>
-            <a:ext cx="3848100" cy="2800767"/>
+            <a:ext cx="4098208" cy="2800767"/>
           </a:xfrm>
           <a:prstGeom prst="rect">
             <a:avLst/>
@@ -9704,7 +9704,21 @@
                 <a:latin typeface="Courier New" pitchFamily="49" charset="0"/>
                 <a:cs typeface="Courier New" pitchFamily="49" charset="0"/>
               </a:rPr>
-              <a:t>void swap(</a:t>
+              <a:t>void </a:t>
+            </a:r>
+            <a:r>
+              <a:rPr lang="en-US" sz="1600" dirty="0" err="1" smtClean="0">
+                <a:latin typeface="Courier New" pitchFamily="49" charset="0"/>
+                <a:cs typeface="Courier New" pitchFamily="49" charset="0"/>
+              </a:rPr>
+              <a:t>swap_val</a:t>
+            </a:r>
+            <a:r>
+              <a:rPr lang="en-US" sz="1600" dirty="0" smtClean="0">
+                <a:latin typeface="Courier New" pitchFamily="49" charset="0"/>
+                <a:cs typeface="Courier New" pitchFamily="49" charset="0"/>
+              </a:rPr>
+              <a:t>(</a:t>
             </a:r>
             <a:r>
               <a:rPr lang="en-US" sz="1600" dirty="0" err="1" smtClean="0">
@@ -9848,7 +9862,7 @@
         </p:nvGrpSpPr>
         <p:grpSpPr>
           <a:xfrm>
-            <a:off x="6457950" y="3848100"/>
+            <a:off x="6939731" y="3867944"/>
             <a:ext cx="2019300" cy="975028"/>
             <a:chOff x="1782925" y="3027889"/>
             <a:chExt cx="2019300" cy="975028"/>
@@ -11784,7 +11798,7 @@
           <a:graphicData uri="http://schemas.openxmlformats.org/presentationml/2006/ole">
             <mc:AlternateContent xmlns:mc="http://schemas.openxmlformats.org/markup-compatibility/2006">
               <mc:Choice xmlns:v="urn:schemas-microsoft-com:vml" Requires="v">
-                <p:oleObj spid="_x0000_s2071" name="Equation" r:id="rId3" imgW="1485720" imgH="609480" progId="Equation.3">
+                <p:oleObj spid="_x0000_s2072" name="Equation" r:id="rId3" imgW="1485720" imgH="609480" progId="Equation.3">
                   <p:embed/>
                 </p:oleObj>
               </mc:Choice>
@@ -18956,7 +18970,7 @@
           <a:graphicData uri="http://schemas.openxmlformats.org/presentationml/2006/ole">
             <mc:AlternateContent xmlns:mc="http://schemas.openxmlformats.org/markup-compatibility/2006">
               <mc:Choice xmlns:v="urn:schemas-microsoft-com:vml" Requires="v">
-                <p:oleObj spid="_x0000_s1062" name="Equation" r:id="rId3" imgW="533160" imgH="431640" progId="Equation.3">
+                <p:oleObj spid="_x0000_s1063" name="Equation" r:id="rId3" imgW="533160" imgH="431640" progId="Equation.3">
                   <p:embed/>
                 </p:oleObj>
               </mc:Choice>
@@ -31314,7 +31328,29 @@
             </a:r>
             <a:r>
               <a:rPr lang="en-US" dirty="0" smtClean="0"/>
-              <a:t> </a:t>
+              <a:t> 10</a:t>
+            </a:r>
+            <a:r>
+              <a:rPr lang="en-US" baseline="30000" dirty="0" smtClean="0"/>
+              <a:t>-308</a:t>
+            </a:r>
+            <a:endParaRPr lang="en-US" dirty="0" smtClean="0"/>
+          </a:p>
+          <a:p>
+            <a:pPr lvl="1"/>
+            <a:r>
+              <a:rPr lang="en-US" dirty="0" smtClean="0"/>
+              <a:t>range </a:t>
+            </a:r>
+            <a:r>
+              <a:rPr lang="en-US" dirty="0">
+                <a:sym typeface="Symbol" panose="05050102010706020507" pitchFamily="18" charset="2"/>
+              </a:rPr>
+              <a:t></a:t>
+            </a:r>
+            <a:r>
+              <a:rPr lang="en-US" dirty="0"/>
+              <a:t> [-</a:t>
             </a:r>
             <a:r>
               <a:rPr lang="en-US" dirty="0" smtClean="0"/>
@@ -31322,29 +31358,11 @@
             </a:r>
             <a:r>
               <a:rPr lang="en-US" baseline="30000" dirty="0" smtClean="0"/>
-              <a:t>-308</a:t>
-            </a:r>
-            <a:endParaRPr lang="en-US" dirty="0" smtClean="0"/>
-          </a:p>
-          <a:p>
-            <a:pPr lvl="1"/>
+              <a:t>308</a:t>
+            </a:r>
             <a:r>
               <a:rPr lang="en-US" dirty="0" smtClean="0"/>
-              <a:t>range </a:t>
-            </a:r>
-            <a:r>
-              <a:rPr lang="en-US" dirty="0">
-                <a:sym typeface="Symbol" panose="05050102010706020507" pitchFamily="18" charset="2"/>
-              </a:rPr>
-              <a:t></a:t>
-            </a:r>
-            <a:r>
-              <a:rPr lang="en-US" dirty="0"/>
-              <a:t> [-</a:t>
-            </a:r>
-            <a:r>
-              <a:rPr lang="en-US" dirty="0" smtClean="0"/>
-              <a:t>10</a:t>
+              <a:t>, 1e</a:t>
             </a:r>
             <a:r>
               <a:rPr lang="en-US" baseline="30000" dirty="0" smtClean="0"/>
@@ -31352,17 +31370,8 @@
             </a:r>
             <a:r>
               <a:rPr lang="en-US" dirty="0" smtClean="0"/>
-              <a:t>, 1e</a:t>
-            </a:r>
-            <a:r>
-              <a:rPr lang="en-US" baseline="30000" dirty="0" smtClean="0"/>
-              <a:t>308</a:t>
-            </a:r>
-            <a:r>
-              <a:rPr lang="en-US" dirty="0" smtClean="0"/>
               <a:t>]</a:t>
             </a:r>
-            <a:endParaRPr lang="en-US" dirty="0" smtClean="0"/>
           </a:p>
           <a:p>
             <a:r>

</xml_diff>